<commit_message>
IM + bout de BDD
</commit_message>
<xml_diff>
--- a/IM/TP5/AwaiPres.pptx
+++ b/IM/TP5/AwaiPres.pptx
@@ -5,7 +5,7 @@
     <p:sldMasterId id="2147483648" r:id="rId1"/>
   </p:sldMasterIdLst>
   <p:notesMasterIdLst>
-    <p:notesMasterId r:id="rId9"/>
+    <p:notesMasterId r:id="rId8"/>
   </p:notesMasterIdLst>
   <p:sldIdLst>
     <p:sldId id="256" r:id="rId2"/>
@@ -13,8 +13,7 @@
     <p:sldId id="257" r:id="rId4"/>
     <p:sldId id="260" r:id="rId5"/>
     <p:sldId id="261" r:id="rId6"/>
-    <p:sldId id="262" r:id="rId7"/>
-    <p:sldId id="263" r:id="rId8"/>
+    <p:sldId id="263" r:id="rId7"/>
   </p:sldIdLst>
   <p:sldSz cx="9144000" cy="6858000" type="screen4x3"/>
   <p:notesSz cx="6858000" cy="9144000"/>
@@ -198,7 +197,7 @@
           <a:p>
             <a:fld id="{662DB91D-774C-7449-AB24-306C4173DAB0}" type="datetimeFigureOut">
               <a:rPr lang="fr-FR" smtClean="0"/>
-              <a:t>07/04/15</a:t>
+              <a:t>08/04/15</a:t>
             </a:fld>
             <a:endParaRPr lang="fr-FR"/>
           </a:p>
@@ -634,90 +633,6 @@
 </p:notes>
 </file>
 
-<file path=ppt/notesSlides/notesSlide3.xml><?xml version="1.0" encoding="utf-8"?>
-<p:notes xmlns:a="http://schemas.openxmlformats.org/drawingml/2006/main" xmlns:r="http://schemas.openxmlformats.org/officeDocument/2006/relationships" xmlns:p="http://schemas.openxmlformats.org/presentationml/2006/main">
-  <p:cSld>
-    <p:spTree>
-      <p:nvGrpSpPr>
-        <p:cNvPr id="1" name=""/>
-        <p:cNvGrpSpPr/>
-        <p:nvPr/>
-      </p:nvGrpSpPr>
-      <p:grpSpPr>
-        <a:xfrm>
-          <a:off x="0" y="0"/>
-          <a:ext cx="0" cy="0"/>
-          <a:chOff x="0" y="0"/>
-          <a:chExt cx="0" cy="0"/>
-        </a:xfrm>
-      </p:grpSpPr>
-      <p:sp>
-        <p:nvSpPr>
-          <p:cNvPr id="2" name="Espace réservé de l'image des diapositives 1"/>
-          <p:cNvSpPr>
-            <a:spLocks noGrp="1" noRot="1" noChangeAspect="1"/>
-          </p:cNvSpPr>
-          <p:nvPr>
-            <p:ph type="sldImg"/>
-          </p:nvPr>
-        </p:nvSpPr>
-        <p:spPr/>
-      </p:sp>
-      <p:sp>
-        <p:nvSpPr>
-          <p:cNvPr id="3" name="Espace réservé des commentaires 2"/>
-          <p:cNvSpPr>
-            <a:spLocks noGrp="1"/>
-          </p:cNvSpPr>
-          <p:nvPr>
-            <p:ph type="body" idx="1"/>
-          </p:nvPr>
-        </p:nvSpPr>
-        <p:spPr/>
-        <p:txBody>
-          <a:bodyPr/>
-          <a:lstStyle/>
-          <a:p>
-            <a:endParaRPr lang="fr-FR" dirty="0"/>
-          </a:p>
-        </p:txBody>
-      </p:sp>
-      <p:sp>
-        <p:nvSpPr>
-          <p:cNvPr id="4" name="Espace réservé du numéro de diapositive 3"/>
-          <p:cNvSpPr>
-            <a:spLocks noGrp="1"/>
-          </p:cNvSpPr>
-          <p:nvPr>
-            <p:ph type="sldNum" sz="quarter" idx="10"/>
-          </p:nvPr>
-        </p:nvSpPr>
-        <p:spPr/>
-        <p:txBody>
-          <a:bodyPr/>
-          <a:lstStyle/>
-          <a:p>
-            <a:fld id="{F8DCC4C4-00A9-4A45-945D-4DDB996BDF1D}" type="slidenum">
-              <a:rPr lang="fr-FR" smtClean="0"/>
-              <a:t>6</a:t>
-            </a:fld>
-            <a:endParaRPr lang="fr-FR"/>
-          </a:p>
-        </p:txBody>
-      </p:sp>
-    </p:spTree>
-    <p:extLst>
-      <p:ext uri="{BB962C8B-B14F-4D97-AF65-F5344CB8AC3E}">
-        <p14:creationId xmlns:p14="http://schemas.microsoft.com/office/powerpoint/2010/main" val="1075766073"/>
-      </p:ext>
-    </p:extLst>
-  </p:cSld>
-  <p:clrMapOvr>
-    <a:masterClrMapping/>
-  </p:clrMapOvr>
-</p:notes>
-</file>
-
 <file path=ppt/slideLayouts/slideLayout1.xml><?xml version="1.0" encoding="utf-8"?>
 <p:sldLayout xmlns:a="http://schemas.openxmlformats.org/drawingml/2006/main" xmlns:r="http://schemas.openxmlformats.org/officeDocument/2006/relationships" xmlns:p="http://schemas.openxmlformats.org/presentationml/2006/main" type="title" preserve="1">
   <p:cSld name="Diapositive de titre">
@@ -899,7 +814,7 @@
           <a:p>
             <a:fld id="{6A49F1D1-51C8-EC4A-B541-75325EE3DD94}" type="datetimeFigureOut">
               <a:rPr lang="fr-FR" smtClean="0"/>
-              <a:t>07/04/15</a:t>
+              <a:t>08/04/15</a:t>
             </a:fld>
             <a:endParaRPr lang="fr-FR"/>
           </a:p>
@@ -1069,7 +984,7 @@
           <a:p>
             <a:fld id="{6A49F1D1-51C8-EC4A-B541-75325EE3DD94}" type="datetimeFigureOut">
               <a:rPr lang="fr-FR" smtClean="0"/>
-              <a:t>07/04/15</a:t>
+              <a:t>08/04/15</a:t>
             </a:fld>
             <a:endParaRPr lang="fr-FR"/>
           </a:p>
@@ -1249,7 +1164,7 @@
           <a:p>
             <a:fld id="{6A49F1D1-51C8-EC4A-B541-75325EE3DD94}" type="datetimeFigureOut">
               <a:rPr lang="fr-FR" smtClean="0"/>
-              <a:t>07/04/15</a:t>
+              <a:t>08/04/15</a:t>
             </a:fld>
             <a:endParaRPr lang="fr-FR"/>
           </a:p>
@@ -1419,7 +1334,7 @@
           <a:p>
             <a:fld id="{6A49F1D1-51C8-EC4A-B541-75325EE3DD94}" type="datetimeFigureOut">
               <a:rPr lang="fr-FR" smtClean="0"/>
-              <a:t>07/04/15</a:t>
+              <a:t>08/04/15</a:t>
             </a:fld>
             <a:endParaRPr lang="fr-FR"/>
           </a:p>
@@ -1665,7 +1580,7 @@
           <a:p>
             <a:fld id="{6A49F1D1-51C8-EC4A-B541-75325EE3DD94}" type="datetimeFigureOut">
               <a:rPr lang="fr-FR" smtClean="0"/>
-              <a:t>07/04/15</a:t>
+              <a:t>08/04/15</a:t>
             </a:fld>
             <a:endParaRPr lang="fr-FR"/>
           </a:p>
@@ -1953,7 +1868,7 @@
           <a:p>
             <a:fld id="{6A49F1D1-51C8-EC4A-B541-75325EE3DD94}" type="datetimeFigureOut">
               <a:rPr lang="fr-FR" smtClean="0"/>
-              <a:t>07/04/15</a:t>
+              <a:t>08/04/15</a:t>
             </a:fld>
             <a:endParaRPr lang="fr-FR"/>
           </a:p>
@@ -2375,7 +2290,7 @@
           <a:p>
             <a:fld id="{6A49F1D1-51C8-EC4A-B541-75325EE3DD94}" type="datetimeFigureOut">
               <a:rPr lang="fr-FR" smtClean="0"/>
-              <a:t>07/04/15</a:t>
+              <a:t>08/04/15</a:t>
             </a:fld>
             <a:endParaRPr lang="fr-FR"/>
           </a:p>
@@ -2493,7 +2408,7 @@
           <a:p>
             <a:fld id="{6A49F1D1-51C8-EC4A-B541-75325EE3DD94}" type="datetimeFigureOut">
               <a:rPr lang="fr-FR" smtClean="0"/>
-              <a:t>07/04/15</a:t>
+              <a:t>08/04/15</a:t>
             </a:fld>
             <a:endParaRPr lang="fr-FR"/>
           </a:p>
@@ -2588,7 +2503,7 @@
           <a:p>
             <a:fld id="{6A49F1D1-51C8-EC4A-B541-75325EE3DD94}" type="datetimeFigureOut">
               <a:rPr lang="fr-FR" smtClean="0"/>
-              <a:t>07/04/15</a:t>
+              <a:t>08/04/15</a:t>
             </a:fld>
             <a:endParaRPr lang="fr-FR"/>
           </a:p>
@@ -2865,7 +2780,7 @@
           <a:p>
             <a:fld id="{6A49F1D1-51C8-EC4A-B541-75325EE3DD94}" type="datetimeFigureOut">
               <a:rPr lang="fr-FR" smtClean="0"/>
-              <a:t>07/04/15</a:t>
+              <a:t>08/04/15</a:t>
             </a:fld>
             <a:endParaRPr lang="fr-FR"/>
           </a:p>
@@ -3118,7 +3033,7 @@
           <a:p>
             <a:fld id="{6A49F1D1-51C8-EC4A-B541-75325EE3DD94}" type="datetimeFigureOut">
               <a:rPr lang="fr-FR" smtClean="0"/>
-              <a:t>07/04/15</a:t>
+              <a:t>08/04/15</a:t>
             </a:fld>
             <a:endParaRPr lang="fr-FR"/>
           </a:p>
@@ -3334,7 +3249,7 @@
           <a:p>
             <a:fld id="{6A49F1D1-51C8-EC4A-B541-75325EE3DD94}" type="datetimeFigureOut">
               <a:rPr lang="fr-FR" smtClean="0"/>
-              <a:t>07/04/15</a:t>
+              <a:t>08/04/15</a:t>
             </a:fld>
             <a:endParaRPr lang="fr-FR"/>
           </a:p>
@@ -4178,7 +4093,7 @@
         </p:nvSpPr>
         <p:spPr>
           <a:xfrm>
-            <a:off x="2095500" y="2152650"/>
+            <a:off x="2095500" y="2368550"/>
             <a:ext cx="5041900" cy="698500"/>
           </a:xfrm>
           <a:prstGeom prst="roundRect">
@@ -4237,7 +4152,7 @@
         </p:nvSpPr>
         <p:spPr>
           <a:xfrm>
-            <a:off x="2095500" y="3003550"/>
+            <a:off x="2095500" y="3219450"/>
             <a:ext cx="5041900" cy="698500"/>
           </a:xfrm>
           <a:prstGeom prst="roundRect">
@@ -4296,7 +4211,7 @@
         </p:nvSpPr>
         <p:spPr>
           <a:xfrm>
-            <a:off x="2095500" y="3854450"/>
+            <a:off x="2095500" y="4070350"/>
             <a:ext cx="5041900" cy="698500"/>
           </a:xfrm>
           <a:prstGeom prst="roundRect">
@@ -4338,65 +4253,6 @@
                 </a:solidFill>
               </a:rPr>
               <a:t>Utilisabilité</a:t>
-            </a:r>
-            <a:endParaRPr lang="fr-FR" sz="3600" dirty="0">
-              <a:solidFill>
-                <a:srgbClr val="444444"/>
-              </a:solidFill>
-            </a:endParaRPr>
-          </a:p>
-        </p:txBody>
-      </p:sp>
-      <p:sp>
-        <p:nvSpPr>
-          <p:cNvPr id="8" name="Rectangle à coins arrondis 7"/>
-          <p:cNvSpPr/>
-          <p:nvPr/>
-        </p:nvSpPr>
-        <p:spPr>
-          <a:xfrm>
-            <a:off x="2095500" y="4705350"/>
-            <a:ext cx="5041900" cy="698500"/>
-          </a:xfrm>
-          <a:prstGeom prst="roundRect">
-            <a:avLst/>
-          </a:prstGeom>
-          <a:solidFill>
-            <a:srgbClr val="C0D4ED"/>
-          </a:solidFill>
-          <a:ln w="3175" cmpd="sng">
-            <a:solidFill>
-              <a:srgbClr val="444444"/>
-            </a:solidFill>
-          </a:ln>
-          <a:effectLst/>
-        </p:spPr>
-        <p:style>
-          <a:lnRef idx="1">
-            <a:schemeClr val="accent1"/>
-          </a:lnRef>
-          <a:fillRef idx="3">
-            <a:schemeClr val="accent1"/>
-          </a:fillRef>
-          <a:effectRef idx="2">
-            <a:schemeClr val="accent1"/>
-          </a:effectRef>
-          <a:fontRef idx="minor">
-            <a:schemeClr val="lt1"/>
-          </a:fontRef>
-        </p:style>
-        <p:txBody>
-          <a:bodyPr rtlCol="0" anchor="ctr"/>
-          <a:lstStyle/>
-          <a:p>
-            <a:pPr algn="ctr"/>
-            <a:r>
-              <a:rPr lang="fr-FR" sz="3600" dirty="0" smtClean="0">
-                <a:solidFill>
-                  <a:srgbClr val="444444"/>
-                </a:solidFill>
-              </a:rPr>
-              <a:t>Aides à l’utilisation</a:t>
             </a:r>
             <a:endParaRPr lang="fr-FR" sz="3600" dirty="0">
               <a:solidFill>
@@ -4668,8 +4524,13 @@
             </a:r>
             <a:r>
               <a:rPr lang="fr-FR" b="1" dirty="0" smtClean="0"/>
-              <a:t>utilisateurs lointains</a:t>
-            </a:r>
+              <a:t>utilisateurs </a:t>
+            </a:r>
+            <a:r>
+              <a:rPr lang="fr-FR" b="1" dirty="0" smtClean="0"/>
+              <a:t>éloignés </a:t>
+            </a:r>
+            <a:endParaRPr lang="fr-FR" b="1" dirty="0" smtClean="0"/>
           </a:p>
           <a:p>
             <a:pPr marL="285750" indent="-285750">
@@ -4693,23 +4554,31 @@
             </a:r>
             <a:r>
               <a:rPr lang="fr-FR" dirty="0" smtClean="0"/>
-              <a:t>systèmes existants (</a:t>
-            </a:r>
-            <a:r>
-              <a:rPr lang="fr-FR" dirty="0" err="1" smtClean="0"/>
-              <a:t>skype</a:t>
+              <a:t>systèmes existants </a:t>
+            </a:r>
+            <a:r>
+              <a:rPr lang="fr-FR" dirty="0" smtClean="0"/>
+              <a:t>(</a:t>
+            </a:r>
+            <a:r>
+              <a:rPr lang="fr-FR" dirty="0"/>
+              <a:t>S</a:t>
+            </a:r>
+            <a:r>
+              <a:rPr lang="fr-FR" dirty="0" smtClean="0"/>
+              <a:t>kype</a:t>
             </a:r>
             <a:r>
               <a:rPr lang="fr-FR" dirty="0" smtClean="0"/>
               <a:t>, </a:t>
             </a:r>
             <a:r>
-              <a:rPr lang="fr-FR" dirty="0" err="1" smtClean="0"/>
-              <a:t>facebook</a:t>
-            </a:r>
-            <a:r>
               <a:rPr lang="fr-FR" dirty="0" smtClean="0"/>
-              <a:t>,..) </a:t>
+              <a:t>Facebook,</a:t>
+            </a:r>
+            <a:r>
+              <a:rPr lang="fr-FR" dirty="0" smtClean="0"/>
+              <a:t>..) </a:t>
             </a:r>
             <a:r>
               <a:rPr lang="fr-FR" dirty="0"/>
@@ -4717,12 +4586,17 @@
             </a:r>
             <a:r>
               <a:rPr lang="fr-FR" b="1" dirty="0"/>
-              <a:t>une seule application</a:t>
-            </a:r>
-            <a:r>
-              <a:rPr lang="fr-FR" dirty="0" smtClean="0"/>
-              <a:t>.</a:t>
-            </a:r>
+              <a:t>une seule </a:t>
+            </a:r>
+            <a:r>
+              <a:rPr lang="fr-FR" b="1" dirty="0" smtClean="0"/>
+              <a:t>applicatio</a:t>
+            </a:r>
+            <a:r>
+              <a:rPr lang="fr-FR" dirty="0"/>
+              <a:t>n</a:t>
+            </a:r>
+            <a:endParaRPr lang="fr-FR" dirty="0" smtClean="0"/>
           </a:p>
           <a:p>
             <a:pPr marL="285750" indent="-285750">
@@ -5112,17 +4986,7 @@
                 <a:latin typeface="Mockup"/>
                 <a:cs typeface="Mockup"/>
               </a:rPr>
-              <a:t>Utilisabilité et lois de </a:t>
-            </a:r>
-            <a:r>
-              <a:rPr lang="fr-FR" sz="3600" dirty="0" err="1" smtClean="0">
-                <a:solidFill>
-                  <a:srgbClr val="444444"/>
-                </a:solidFill>
-                <a:latin typeface="Mockup"/>
-                <a:cs typeface="Mockup"/>
-              </a:rPr>
-              <a:t>Gesalt</a:t>
+              <a:t>Utilisabilité</a:t>
             </a:r>
             <a:endParaRPr lang="fr-FR" sz="3600" dirty="0">
               <a:solidFill>
@@ -5196,13 +5060,173 @@
               </a:rPr>
               <a:t>5</a:t>
             </a:r>
-            <a:endParaRPr lang="fr-FR" sz="4000" dirty="0">
-              <a:solidFill>
-                <a:srgbClr val="444444"/>
-              </a:solidFill>
-              <a:latin typeface="Showcard Gothic"/>
-              <a:cs typeface="Showcard Gothic"/>
-            </a:endParaRPr>
+          </a:p>
+        </p:txBody>
+      </p:sp>
+      <p:sp>
+        <p:nvSpPr>
+          <p:cNvPr id="6" name="ZoneTexte 5"/>
+          <p:cNvSpPr txBox="1"/>
+          <p:nvPr/>
+        </p:nvSpPr>
+        <p:spPr>
+          <a:xfrm>
+            <a:off x="482600" y="1809750"/>
+            <a:ext cx="8166100" cy="3970318"/>
+          </a:xfrm>
+          <a:prstGeom prst="rect">
+            <a:avLst/>
+          </a:prstGeom>
+          <a:noFill/>
+        </p:spPr>
+        <p:txBody>
+          <a:bodyPr wrap="square" rtlCol="0">
+            <a:spAutoFit/>
+          </a:bodyPr>
+          <a:lstStyle/>
+          <a:p>
+            <a:pPr marL="285750" indent="-285750">
+              <a:buFont typeface="Courier New"/>
+              <a:buChar char="o"/>
+            </a:pPr>
+            <a:endParaRPr lang="fr-FR" dirty="0" smtClean="0"/>
+          </a:p>
+          <a:p>
+            <a:pPr marL="285750" indent="-285750">
+              <a:buFont typeface="Courier New"/>
+              <a:buChar char="o"/>
+            </a:pPr>
+            <a:r>
+              <a:rPr lang="fr-FR" b="1" dirty="0" smtClean="0"/>
+              <a:t>Facilité d’apprentissage </a:t>
+            </a:r>
+            <a:r>
+              <a:rPr lang="fr-FR" dirty="0" smtClean="0"/>
+              <a:t>: ToolTip, Aides sur toutes les pages</a:t>
+            </a:r>
+            <a:r>
+              <a:rPr lang="fr-FR" b="1" dirty="0" smtClean="0"/>
+              <a:t> </a:t>
+            </a:r>
+          </a:p>
+          <a:p>
+            <a:endParaRPr lang="fr-FR" b="1" dirty="0" smtClean="0"/>
+          </a:p>
+          <a:p>
+            <a:pPr marL="285750" indent="-285750">
+              <a:buFont typeface="Courier New"/>
+              <a:buChar char="o"/>
+            </a:pPr>
+            <a:endParaRPr lang="fr-FR" dirty="0" smtClean="0"/>
+          </a:p>
+          <a:p>
+            <a:pPr marL="285750" indent="-285750">
+              <a:buFont typeface="Courier New"/>
+              <a:buChar char="o"/>
+            </a:pPr>
+            <a:r>
+              <a:rPr lang="fr-FR" b="1" dirty="0" smtClean="0"/>
+              <a:t>Facilité d’appropriation </a:t>
+            </a:r>
+            <a:r>
+              <a:rPr lang="fr-FR" dirty="0" smtClean="0"/>
+              <a:t>: Ic</a:t>
+            </a:r>
+            <a:r>
+              <a:rPr lang="fr-FR" dirty="0" smtClean="0"/>
+              <a:t>ô</a:t>
+            </a:r>
+            <a:r>
+              <a:rPr lang="fr-FR" dirty="0" smtClean="0"/>
+              <a:t>nes significatives, </a:t>
+            </a:r>
+            <a:r>
+              <a:rPr lang="fr-FR" dirty="0" smtClean="0"/>
+              <a:t>b</a:t>
+            </a:r>
+            <a:r>
+              <a:rPr lang="fr-FR" dirty="0" smtClean="0"/>
+              <a:t>ase de navigation permanente </a:t>
+            </a:r>
+            <a:endParaRPr lang="fr-FR" b="1" dirty="0" smtClean="0"/>
+          </a:p>
+          <a:p>
+            <a:endParaRPr lang="fr-FR" b="1" dirty="0" smtClean="0"/>
+          </a:p>
+          <a:p>
+            <a:pPr marL="285750" indent="-285750">
+              <a:buFont typeface="Courier New"/>
+              <a:buChar char="o"/>
+            </a:pPr>
+            <a:endParaRPr lang="fr-FR" dirty="0"/>
+          </a:p>
+          <a:p>
+            <a:pPr marL="285750" indent="-285750">
+              <a:buFont typeface="Courier New"/>
+              <a:buChar char="o"/>
+            </a:pPr>
+            <a:r>
+              <a:rPr lang="fr-FR" b="1" dirty="0" smtClean="0"/>
+              <a:t>Fiabilité </a:t>
+            </a:r>
+            <a:r>
+              <a:rPr lang="fr-FR" dirty="0" smtClean="0"/>
+              <a:t>: Gestion des erreurs</a:t>
+            </a:r>
+          </a:p>
+          <a:p>
+            <a:endParaRPr lang="fr-FR" dirty="0"/>
+          </a:p>
+          <a:p>
+            <a:endParaRPr lang="fr-FR" dirty="0" smtClean="0"/>
+          </a:p>
+          <a:p>
+            <a:pPr marL="285750" indent="-285750">
+              <a:buFont typeface="Courier New"/>
+              <a:buChar char="o"/>
+            </a:pPr>
+            <a:r>
+              <a:rPr lang="fr-FR" b="1" dirty="0" smtClean="0"/>
+              <a:t>Efficience </a:t>
+            </a:r>
+            <a:r>
+              <a:rPr lang="fr-FR" dirty="0" smtClean="0"/>
+              <a:t>: Changement de fonctionnalité possible sur chaque fen</a:t>
+            </a:r>
+            <a:r>
+              <a:rPr lang="fr-FR" dirty="0" smtClean="0"/>
+              <a:t>être et rapide</a:t>
+            </a:r>
+            <a:endParaRPr lang="fr-FR" dirty="0" smtClean="0"/>
+          </a:p>
+          <a:p>
+            <a:endParaRPr lang="fr-FR" b="1" dirty="0" smtClean="0"/>
+          </a:p>
+          <a:p>
+            <a:pPr marL="285750" indent="-285750">
+              <a:buFont typeface="Courier New"/>
+              <a:buChar char="o"/>
+            </a:pPr>
+            <a:endParaRPr lang="fr-FR" dirty="0"/>
+          </a:p>
+          <a:p>
+            <a:pPr marL="285750" indent="-285750">
+              <a:buFont typeface="Courier New"/>
+              <a:buChar char="o"/>
+            </a:pPr>
+            <a:r>
+              <a:rPr lang="fr-FR" b="1" dirty="0" smtClean="0"/>
+              <a:t>Satisfaction </a:t>
+            </a:r>
+            <a:r>
+              <a:rPr lang="fr-FR" dirty="0" smtClean="0"/>
+              <a:t>: </a:t>
+            </a:r>
+            <a:r>
+              <a:rPr lang="fr-FR" dirty="0" smtClean="0"/>
+              <a:t>Navigation fluide</a:t>
+            </a:r>
+            <a:endParaRPr lang="fr-FR" dirty="0"/>
           </a:p>
         </p:txBody>
       </p:sp>
@@ -5220,187 +5244,6 @@
 </file>
 
 <file path=ppt/slides/slide6.xml><?xml version="1.0" encoding="utf-8"?>
-<p:sld xmlns:a="http://schemas.openxmlformats.org/drawingml/2006/main" xmlns:r="http://schemas.openxmlformats.org/officeDocument/2006/relationships" xmlns:p="http://schemas.openxmlformats.org/presentationml/2006/main">
-  <p:cSld>
-    <p:spTree>
-      <p:nvGrpSpPr>
-        <p:cNvPr id="1" name=""/>
-        <p:cNvGrpSpPr/>
-        <p:nvPr/>
-      </p:nvGrpSpPr>
-      <p:grpSpPr>
-        <a:xfrm>
-          <a:off x="0" y="0"/>
-          <a:ext cx="0" cy="0"/>
-          <a:chOff x="0" y="0"/>
-          <a:chExt cx="0" cy="0"/>
-        </a:xfrm>
-      </p:grpSpPr>
-      <p:cxnSp>
-        <p:nvCxnSpPr>
-          <p:cNvPr id="8" name="Connecteur droit 7"/>
-          <p:cNvCxnSpPr/>
-          <p:nvPr/>
-        </p:nvCxnSpPr>
-        <p:spPr>
-          <a:xfrm>
-            <a:off x="0" y="1117600"/>
-            <a:ext cx="9144000" cy="0"/>
-          </a:xfrm>
-          <a:prstGeom prst="line">
-            <a:avLst/>
-          </a:prstGeom>
-          <a:ln>
-            <a:solidFill>
-              <a:srgbClr val="444444"/>
-            </a:solidFill>
-          </a:ln>
-          <a:effectLst/>
-        </p:spPr>
-        <p:style>
-          <a:lnRef idx="2">
-            <a:schemeClr val="accent1"/>
-          </a:lnRef>
-          <a:fillRef idx="0">
-            <a:schemeClr val="accent1"/>
-          </a:fillRef>
-          <a:effectRef idx="1">
-            <a:schemeClr val="accent1"/>
-          </a:effectRef>
-          <a:fontRef idx="minor">
-            <a:schemeClr val="tx1"/>
-          </a:fontRef>
-        </p:style>
-      </p:cxnSp>
-      <p:sp>
-        <p:nvSpPr>
-          <p:cNvPr id="13" name="ZoneTexte 12"/>
-          <p:cNvSpPr txBox="1"/>
-          <p:nvPr/>
-        </p:nvSpPr>
-        <p:spPr>
-          <a:xfrm>
-            <a:off x="3467100" y="302090"/>
-            <a:ext cx="5448300" cy="646331"/>
-          </a:xfrm>
-          <a:prstGeom prst="rect">
-            <a:avLst/>
-          </a:prstGeom>
-          <a:noFill/>
-        </p:spPr>
-        <p:txBody>
-          <a:bodyPr wrap="square" rtlCol="0">
-            <a:spAutoFit/>
-          </a:bodyPr>
-          <a:lstStyle/>
-          <a:p>
-            <a:pPr algn="r"/>
-            <a:r>
-              <a:rPr lang="fr-FR" sz="3600" dirty="0" smtClean="0">
-                <a:solidFill>
-                  <a:srgbClr val="444444"/>
-                </a:solidFill>
-                <a:latin typeface="Mockup"/>
-                <a:cs typeface="Mockup"/>
-              </a:rPr>
-              <a:t>Aides à l’utilisation</a:t>
-            </a:r>
-            <a:endParaRPr lang="fr-FR" sz="3600" dirty="0">
-              <a:solidFill>
-                <a:srgbClr val="444444"/>
-              </a:solidFill>
-              <a:latin typeface="Mockup"/>
-              <a:cs typeface="Mockup"/>
-            </a:endParaRPr>
-          </a:p>
-        </p:txBody>
-      </p:sp>
-      <p:pic>
-        <p:nvPicPr>
-          <p:cNvPr id="21" name="Image 20" descr="erreur.png"/>
-          <p:cNvPicPr>
-            <a:picLocks noChangeAspect="1"/>
-          </p:cNvPicPr>
-          <p:nvPr/>
-        </p:nvPicPr>
-        <p:blipFill>
-          <a:blip r:embed="rId3">
-            <a:extLst>
-              <a:ext uri="{28A0092B-C50C-407E-A947-70E740481C1C}">
-                <a14:useLocalDpi xmlns:a14="http://schemas.microsoft.com/office/drawing/2010/main" val="0"/>
-              </a:ext>
-            </a:extLst>
-          </a:blip>
-          <a:stretch>
-            <a:fillRect/>
-          </a:stretch>
-        </p:blipFill>
-        <p:spPr>
-          <a:xfrm>
-            <a:off x="225985" y="703600"/>
-            <a:ext cx="870245" cy="828000"/>
-          </a:xfrm>
-          <a:prstGeom prst="rect">
-            <a:avLst/>
-          </a:prstGeom>
-        </p:spPr>
-      </p:pic>
-      <p:sp>
-        <p:nvSpPr>
-          <p:cNvPr id="6" name="ZoneTexte 5"/>
-          <p:cNvSpPr txBox="1"/>
-          <p:nvPr/>
-        </p:nvSpPr>
-        <p:spPr>
-          <a:xfrm>
-            <a:off x="8516862" y="5969000"/>
-            <a:ext cx="458679" cy="707886"/>
-          </a:xfrm>
-          <a:prstGeom prst="rect">
-            <a:avLst/>
-          </a:prstGeom>
-          <a:noFill/>
-        </p:spPr>
-        <p:txBody>
-          <a:bodyPr wrap="none" rtlCol="0">
-            <a:spAutoFit/>
-          </a:bodyPr>
-          <a:lstStyle/>
-          <a:p>
-            <a:r>
-              <a:rPr lang="fr-FR" sz="4000" dirty="0">
-                <a:solidFill>
-                  <a:srgbClr val="444444"/>
-                </a:solidFill>
-                <a:latin typeface="Showcard Gothic"/>
-                <a:cs typeface="Showcard Gothic"/>
-              </a:rPr>
-              <a:t>6</a:t>
-            </a:r>
-            <a:endParaRPr lang="fr-FR" sz="4000" dirty="0">
-              <a:solidFill>
-                <a:srgbClr val="444444"/>
-              </a:solidFill>
-              <a:latin typeface="Showcard Gothic"/>
-              <a:cs typeface="Showcard Gothic"/>
-            </a:endParaRPr>
-          </a:p>
-        </p:txBody>
-      </p:sp>
-    </p:spTree>
-    <p:extLst>
-      <p:ext uri="{BB962C8B-B14F-4D97-AF65-F5344CB8AC3E}">
-        <p14:creationId xmlns:p14="http://schemas.microsoft.com/office/powerpoint/2010/main" val="871030037"/>
-      </p:ext>
-    </p:extLst>
-  </p:cSld>
-  <p:clrMapOvr>
-    <a:masterClrMapping/>
-  </p:clrMapOvr>
-</p:sld>
-</file>
-
-<file path=ppt/slides/slide7.xml><?xml version="1.0" encoding="utf-8"?>
 <p:sld xmlns:a="http://schemas.openxmlformats.org/drawingml/2006/main" xmlns:r="http://schemas.openxmlformats.org/officeDocument/2006/relationships" xmlns:p="http://schemas.openxmlformats.org/presentationml/2006/main">
   <p:cSld>
     <p:spTree>

</xml_diff>